<commit_message>
Update README et Powerpoint
</commit_message>
<xml_diff>
--- a/Data/Projet de NSI.pptx
+++ b/Data/Projet de NSI.pptx
@@ -7,6 +7,8 @@
   <p:sldIdLst>
     <p:sldId id="256" r:id="rId2"/>
     <p:sldId id="257" r:id="rId3"/>
+    <p:sldId id="258" r:id="rId4"/>
+    <p:sldId id="259" r:id="rId5"/>
   </p:sldIdLst>
   <p:sldSz cx="12192000" cy="6858000"/>
   <p:notesSz cx="6858000" cy="9144000"/>
@@ -105,6 +107,11 @@
       </a:defRPr>
     </a:lvl9pPr>
   </p:defaultTextStyle>
+  <p:extLst>
+    <p:ext uri="{EFAFB233-063F-42B5-8137-9DF3F51BA10A}">
+      <p15:sldGuideLst xmlns:p15="http://schemas.microsoft.com/office/powerpoint/2012/main"/>
+    </p:ext>
+  </p:extLst>
 </p:presentation>
 </file>
 
@@ -158,7 +165,7 @@
           <a:noFill/>
           <a:extLst>
             <a:ext uri="{909E8E84-426E-40dd-AFC4-6F175D3DCCD1}">
-              <a14:hiddenFill xmlns:a14="http://schemas.microsoft.com/office/drawing/2010/main" xmlns="">
+              <a14:hiddenFill xmlns="" xmlns:a14="http://schemas.microsoft.com/office/drawing/2010/main">
                 <a:solidFill>
                   <a:srgbClr val="FFFFFF"/>
                 </a:solidFill>
@@ -218,7 +225,7 @@
             </a:ln>
             <a:extLst>
               <a:ext uri="{91240B29-F687-4f45-9708-019B960494DF}">
-                <a14:hiddenLine xmlns:a14="http://schemas.microsoft.com/office/drawing/2010/main" xmlns="" w="9525">
+                <a14:hiddenLine xmlns="" xmlns:a14="http://schemas.microsoft.com/office/drawing/2010/main" w="9525">
                   <a:solidFill>
                     <a:srgbClr val="000000"/>
                   </a:solidFill>
@@ -308,7 +315,7 @@
             </a:ln>
             <a:extLst>
               <a:ext uri="{91240B29-F687-4f45-9708-019B960494DF}">
-                <a14:hiddenLine xmlns:a14="http://schemas.microsoft.com/office/drawing/2010/main" xmlns="" w="9525">
+                <a14:hiddenLine xmlns="" xmlns:a14="http://schemas.microsoft.com/office/drawing/2010/main" w="9525">
                   <a:solidFill>
                     <a:srgbClr val="000000"/>
                   </a:solidFill>
@@ -398,7 +405,7 @@
             </a:ln>
             <a:extLst>
               <a:ext uri="{91240B29-F687-4f45-9708-019B960494DF}">
-                <a14:hiddenLine xmlns:a14="http://schemas.microsoft.com/office/drawing/2010/main" xmlns="" w="9525">
+                <a14:hiddenLine xmlns="" xmlns:a14="http://schemas.microsoft.com/office/drawing/2010/main" w="9525">
                   <a:solidFill>
                     <a:srgbClr val="000000"/>
                   </a:solidFill>
@@ -432,7 +439,7 @@
             </a:ln>
             <a:extLst>
               <a:ext uri="{91240B29-F687-4f45-9708-019B960494DF}">
-                <a14:hiddenLine xmlns:a14="http://schemas.microsoft.com/office/drawing/2010/main" xmlns="" w="9525">
+                <a14:hiddenLine xmlns="" xmlns:a14="http://schemas.microsoft.com/office/drawing/2010/main" w="9525">
                   <a:solidFill>
                     <a:srgbClr val="000000"/>
                   </a:solidFill>
@@ -522,7 +529,7 @@
             </a:ln>
             <a:extLst>
               <a:ext uri="{91240B29-F687-4f45-9708-019B960494DF}">
-                <a14:hiddenLine xmlns:a14="http://schemas.microsoft.com/office/drawing/2010/main" xmlns="" w="9525">
+                <a14:hiddenLine xmlns="" xmlns:a14="http://schemas.microsoft.com/office/drawing/2010/main" w="9525">
                   <a:solidFill>
                     <a:srgbClr val="000000"/>
                   </a:solidFill>
@@ -584,7 +591,7 @@
             </a:ln>
             <a:extLst>
               <a:ext uri="{91240B29-F687-4f45-9708-019B960494DF}">
-                <a14:hiddenLine xmlns:a14="http://schemas.microsoft.com/office/drawing/2010/main" xmlns="" w="9525">
+                <a14:hiddenLine xmlns="" xmlns:a14="http://schemas.microsoft.com/office/drawing/2010/main" w="9525">
                   <a:solidFill>
                     <a:srgbClr val="000000"/>
                   </a:solidFill>
@@ -646,7 +653,7 @@
             </a:ln>
             <a:extLst>
               <a:ext uri="{91240B29-F687-4f45-9708-019B960494DF}">
-                <a14:hiddenLine xmlns:a14="http://schemas.microsoft.com/office/drawing/2010/main" xmlns="" w="9525">
+                <a14:hiddenLine xmlns="" xmlns:a14="http://schemas.microsoft.com/office/drawing/2010/main" w="9525">
                   <a:solidFill>
                     <a:srgbClr val="000000"/>
                   </a:solidFill>
@@ -736,7 +743,7 @@
             </a:ln>
             <a:extLst>
               <a:ext uri="{91240B29-F687-4f45-9708-019B960494DF}">
-                <a14:hiddenLine xmlns:a14="http://schemas.microsoft.com/office/drawing/2010/main" xmlns="" w="9525">
+                <a14:hiddenLine xmlns="" xmlns:a14="http://schemas.microsoft.com/office/drawing/2010/main" w="9525">
                   <a:solidFill>
                     <a:srgbClr val="000000"/>
                   </a:solidFill>
@@ -798,7 +805,7 @@
             </a:ln>
             <a:extLst>
               <a:ext uri="{91240B29-F687-4f45-9708-019B960494DF}">
-                <a14:hiddenLine xmlns:a14="http://schemas.microsoft.com/office/drawing/2010/main" xmlns="" w="9525">
+                <a14:hiddenLine xmlns="" xmlns:a14="http://schemas.microsoft.com/office/drawing/2010/main" w="9525">
                   <a:solidFill>
                     <a:srgbClr val="000000"/>
                   </a:solidFill>
@@ -860,7 +867,7 @@
             </a:ln>
             <a:extLst>
               <a:ext uri="{91240B29-F687-4f45-9708-019B960494DF}">
-                <a14:hiddenLine xmlns:a14="http://schemas.microsoft.com/office/drawing/2010/main" xmlns="" w="9525">
+                <a14:hiddenLine xmlns="" xmlns:a14="http://schemas.microsoft.com/office/drawing/2010/main" w="9525">
                   <a:solidFill>
                     <a:srgbClr val="000000"/>
                   </a:solidFill>
@@ -950,7 +957,7 @@
             </a:ln>
             <a:extLst>
               <a:ext uri="{91240B29-F687-4f45-9708-019B960494DF}">
-                <a14:hiddenLine xmlns:a14="http://schemas.microsoft.com/office/drawing/2010/main" xmlns="" w="9525">
+                <a14:hiddenLine xmlns="" xmlns:a14="http://schemas.microsoft.com/office/drawing/2010/main" w="9525">
                   <a:solidFill>
                     <a:srgbClr val="000000"/>
                   </a:solidFill>
@@ -1040,7 +1047,7 @@
             </a:ln>
             <a:extLst>
               <a:ext uri="{91240B29-F687-4f45-9708-019B960494DF}">
-                <a14:hiddenLine xmlns:a14="http://schemas.microsoft.com/office/drawing/2010/main" xmlns="" w="9525">
+                <a14:hiddenLine xmlns="" xmlns:a14="http://schemas.microsoft.com/office/drawing/2010/main" w="9525">
                   <a:solidFill>
                     <a:srgbClr val="000000"/>
                   </a:solidFill>
@@ -1102,7 +1109,7 @@
             </a:ln>
             <a:extLst>
               <a:ext uri="{91240B29-F687-4f45-9708-019B960494DF}">
-                <a14:hiddenLine xmlns:a14="http://schemas.microsoft.com/office/drawing/2010/main" xmlns="" w="9525">
+                <a14:hiddenLine xmlns="" xmlns:a14="http://schemas.microsoft.com/office/drawing/2010/main" w="9525">
                   <a:solidFill>
                     <a:srgbClr val="000000"/>
                   </a:solidFill>
@@ -1212,7 +1219,7 @@
             </a:ln>
             <a:extLst>
               <a:ext uri="{91240B29-F687-4f45-9708-019B960494DF}">
-                <a14:hiddenLine xmlns:a14="http://schemas.microsoft.com/office/drawing/2010/main" xmlns="" w="9525">
+                <a14:hiddenLine xmlns="" xmlns:a14="http://schemas.microsoft.com/office/drawing/2010/main" w="9525">
                   <a:solidFill>
                     <a:srgbClr val="000000"/>
                   </a:solidFill>
@@ -1274,7 +1281,7 @@
             </a:ln>
             <a:extLst>
               <a:ext uri="{91240B29-F687-4f45-9708-019B960494DF}">
-                <a14:hiddenLine xmlns:a14="http://schemas.microsoft.com/office/drawing/2010/main" xmlns="" w="9525">
+                <a14:hiddenLine xmlns="" xmlns:a14="http://schemas.microsoft.com/office/drawing/2010/main" w="9525">
                   <a:solidFill>
                     <a:srgbClr val="000000"/>
                   </a:solidFill>
@@ -1364,7 +1371,7 @@
             </a:ln>
             <a:extLst>
               <a:ext uri="{91240B29-F687-4f45-9708-019B960494DF}">
-                <a14:hiddenLine xmlns:a14="http://schemas.microsoft.com/office/drawing/2010/main" xmlns="" w="9525">
+                <a14:hiddenLine xmlns="" xmlns:a14="http://schemas.microsoft.com/office/drawing/2010/main" w="9525">
                   <a:solidFill>
                     <a:srgbClr val="000000"/>
                   </a:solidFill>
@@ -1454,7 +1461,7 @@
             </a:ln>
             <a:extLst>
               <a:ext uri="{91240B29-F687-4f45-9708-019B960494DF}">
-                <a14:hiddenLine xmlns:a14="http://schemas.microsoft.com/office/drawing/2010/main" xmlns="" w="9525">
+                <a14:hiddenLine xmlns="" xmlns:a14="http://schemas.microsoft.com/office/drawing/2010/main" w="9525">
                   <a:solidFill>
                     <a:srgbClr val="000000"/>
                   </a:solidFill>
@@ -1516,7 +1523,7 @@
             </a:ln>
             <a:extLst>
               <a:ext uri="{91240B29-F687-4f45-9708-019B960494DF}">
-                <a14:hiddenLine xmlns:a14="http://schemas.microsoft.com/office/drawing/2010/main" xmlns="" w="9525">
+                <a14:hiddenLine xmlns="" xmlns:a14="http://schemas.microsoft.com/office/drawing/2010/main" w="9525">
                   <a:solidFill>
                     <a:srgbClr val="000000"/>
                   </a:solidFill>
@@ -1606,7 +1613,7 @@
             </a:ln>
             <a:extLst>
               <a:ext uri="{91240B29-F687-4f45-9708-019B960494DF}">
-                <a14:hiddenLine xmlns:a14="http://schemas.microsoft.com/office/drawing/2010/main" xmlns="" w="9525">
+                <a14:hiddenLine xmlns="" xmlns:a14="http://schemas.microsoft.com/office/drawing/2010/main" w="9525">
                   <a:solidFill>
                     <a:srgbClr val="000000"/>
                   </a:solidFill>
@@ -1696,7 +1703,7 @@
             </a:ln>
             <a:extLst>
               <a:ext uri="{91240B29-F687-4f45-9708-019B960494DF}">
-                <a14:hiddenLine xmlns:a14="http://schemas.microsoft.com/office/drawing/2010/main" xmlns="" w="9525">
+                <a14:hiddenLine xmlns="" xmlns:a14="http://schemas.microsoft.com/office/drawing/2010/main" w="9525">
                   <a:solidFill>
                     <a:srgbClr val="000000"/>
                   </a:solidFill>
@@ -1752,7 +1759,7 @@
             </a:ln>
             <a:extLst>
               <a:ext uri="{91240B29-F687-4f45-9708-019B960494DF}">
-                <a14:hiddenLine xmlns:a14="http://schemas.microsoft.com/office/drawing/2010/main" xmlns="" w="9525">
+                <a14:hiddenLine xmlns="" xmlns:a14="http://schemas.microsoft.com/office/drawing/2010/main" w="9525">
                   <a:solidFill>
                     <a:srgbClr val="000000"/>
                   </a:solidFill>
@@ -1842,7 +1849,7 @@
             </a:ln>
             <a:extLst>
               <a:ext uri="{91240B29-F687-4f45-9708-019B960494DF}">
-                <a14:hiddenLine xmlns:a14="http://schemas.microsoft.com/office/drawing/2010/main" xmlns="" w="9525">
+                <a14:hiddenLine xmlns="" xmlns:a14="http://schemas.microsoft.com/office/drawing/2010/main" w="9525">
                   <a:solidFill>
                     <a:srgbClr val="000000"/>
                   </a:solidFill>
@@ -1898,7 +1905,7 @@
             </a:ln>
             <a:extLst>
               <a:ext uri="{91240B29-F687-4f45-9708-019B960494DF}">
-                <a14:hiddenLine xmlns:a14="http://schemas.microsoft.com/office/drawing/2010/main" xmlns="" w="9525">
+                <a14:hiddenLine xmlns="" xmlns:a14="http://schemas.microsoft.com/office/drawing/2010/main" w="9525">
                   <a:solidFill>
                     <a:srgbClr val="000000"/>
                   </a:solidFill>
@@ -1988,7 +1995,7 @@
             </a:ln>
             <a:extLst>
               <a:ext uri="{91240B29-F687-4f45-9708-019B960494DF}">
-                <a14:hiddenLine xmlns:a14="http://schemas.microsoft.com/office/drawing/2010/main" xmlns="" w="9525">
+                <a14:hiddenLine xmlns="" xmlns:a14="http://schemas.microsoft.com/office/drawing/2010/main" w="9525">
                   <a:solidFill>
                     <a:srgbClr val="000000"/>
                   </a:solidFill>
@@ -2056,7 +2063,7 @@
             </a:ln>
             <a:extLst>
               <a:ext uri="{91240B29-F687-4f45-9708-019B960494DF}">
-                <a14:hiddenLine xmlns:a14="http://schemas.microsoft.com/office/drawing/2010/main" xmlns="" w="9525">
+                <a14:hiddenLine xmlns="" xmlns:a14="http://schemas.microsoft.com/office/drawing/2010/main" w="9525">
                   <a:solidFill>
                     <a:srgbClr val="000000"/>
                   </a:solidFill>
@@ -2146,7 +2153,7 @@
             </a:ln>
             <a:extLst>
               <a:ext uri="{91240B29-F687-4f45-9708-019B960494DF}">
-                <a14:hiddenLine xmlns:a14="http://schemas.microsoft.com/office/drawing/2010/main" xmlns="" w="9525">
+                <a14:hiddenLine xmlns="" xmlns:a14="http://schemas.microsoft.com/office/drawing/2010/main" w="9525">
                   <a:solidFill>
                     <a:srgbClr val="000000"/>
                   </a:solidFill>
@@ -2214,7 +2221,7 @@
             </a:ln>
             <a:extLst>
               <a:ext uri="{91240B29-F687-4f45-9708-019B960494DF}">
-                <a14:hiddenLine xmlns:a14="http://schemas.microsoft.com/office/drawing/2010/main" xmlns="" w="9525">
+                <a14:hiddenLine xmlns="" xmlns:a14="http://schemas.microsoft.com/office/drawing/2010/main" w="9525">
                   <a:solidFill>
                     <a:srgbClr val="000000"/>
                   </a:solidFill>
@@ -2304,7 +2311,7 @@
             </a:ln>
             <a:extLst>
               <a:ext uri="{91240B29-F687-4f45-9708-019B960494DF}">
-                <a14:hiddenLine xmlns:a14="http://schemas.microsoft.com/office/drawing/2010/main" xmlns="" w="9525">
+                <a14:hiddenLine xmlns="" xmlns:a14="http://schemas.microsoft.com/office/drawing/2010/main" w="9525">
                   <a:solidFill>
                     <a:srgbClr val="000000"/>
                   </a:solidFill>
@@ -2338,7 +2345,7 @@
             </a:ln>
             <a:extLst>
               <a:ext uri="{91240B29-F687-4f45-9708-019B960494DF}">
-                <a14:hiddenLine xmlns:a14="http://schemas.microsoft.com/office/drawing/2010/main" xmlns="" w="9525">
+                <a14:hiddenLine xmlns="" xmlns:a14="http://schemas.microsoft.com/office/drawing/2010/main" w="9525">
                   <a:solidFill>
                     <a:srgbClr val="000000"/>
                   </a:solidFill>
@@ -2428,7 +2435,7 @@
             </a:ln>
             <a:extLst>
               <a:ext uri="{91240B29-F687-4f45-9708-019B960494DF}">
-                <a14:hiddenLine xmlns:a14="http://schemas.microsoft.com/office/drawing/2010/main" xmlns="" w="9525">
+                <a14:hiddenLine xmlns="" xmlns:a14="http://schemas.microsoft.com/office/drawing/2010/main" w="9525">
                   <a:solidFill>
                     <a:srgbClr val="000000"/>
                   </a:solidFill>
@@ -2490,7 +2497,7 @@
             </a:ln>
             <a:extLst>
               <a:ext uri="{91240B29-F687-4f45-9708-019B960494DF}">
-                <a14:hiddenLine xmlns:a14="http://schemas.microsoft.com/office/drawing/2010/main" xmlns="" w="9525">
+                <a14:hiddenLine xmlns="" xmlns:a14="http://schemas.microsoft.com/office/drawing/2010/main" w="9525">
                   <a:solidFill>
                     <a:srgbClr val="000000"/>
                   </a:solidFill>
@@ -2552,7 +2559,7 @@
             </a:ln>
             <a:extLst>
               <a:ext uri="{91240B29-F687-4f45-9708-019B960494DF}">
-                <a14:hiddenLine xmlns:a14="http://schemas.microsoft.com/office/drawing/2010/main" xmlns="" w="9525">
+                <a14:hiddenLine xmlns="" xmlns:a14="http://schemas.microsoft.com/office/drawing/2010/main" w="9525">
                   <a:solidFill>
                     <a:srgbClr val="000000"/>
                   </a:solidFill>
@@ -2642,7 +2649,7 @@
             </a:ln>
             <a:extLst>
               <a:ext uri="{91240B29-F687-4f45-9708-019B960494DF}">
-                <a14:hiddenLine xmlns:a14="http://schemas.microsoft.com/office/drawing/2010/main" xmlns="" w="9525">
+                <a14:hiddenLine xmlns="" xmlns:a14="http://schemas.microsoft.com/office/drawing/2010/main" w="9525">
                   <a:solidFill>
                     <a:srgbClr val="000000"/>
                   </a:solidFill>
@@ -2710,7 +2717,7 @@
             </a:ln>
             <a:extLst>
               <a:ext uri="{91240B29-F687-4f45-9708-019B960494DF}">
-                <a14:hiddenLine xmlns:a14="http://schemas.microsoft.com/office/drawing/2010/main" xmlns="" w="9525">
+                <a14:hiddenLine xmlns="" xmlns:a14="http://schemas.microsoft.com/office/drawing/2010/main" w="9525">
                   <a:solidFill>
                     <a:srgbClr val="000000"/>
                   </a:solidFill>
@@ -2772,7 +2779,7 @@
             </a:ln>
             <a:extLst>
               <a:ext uri="{91240B29-F687-4f45-9708-019B960494DF}">
-                <a14:hiddenLine xmlns:a14="http://schemas.microsoft.com/office/drawing/2010/main" xmlns="" w="9525">
+                <a14:hiddenLine xmlns="" xmlns:a14="http://schemas.microsoft.com/office/drawing/2010/main" w="9525">
                   <a:solidFill>
                     <a:srgbClr val="000000"/>
                   </a:solidFill>
@@ -2862,7 +2869,7 @@
             </a:ln>
             <a:extLst>
               <a:ext uri="{91240B29-F687-4f45-9708-019B960494DF}">
-                <a14:hiddenLine xmlns:a14="http://schemas.microsoft.com/office/drawing/2010/main" xmlns="" w="9525">
+                <a14:hiddenLine xmlns="" xmlns:a14="http://schemas.microsoft.com/office/drawing/2010/main" w="9525">
                   <a:solidFill>
                     <a:srgbClr val="000000"/>
                   </a:solidFill>
@@ -2924,7 +2931,7 @@
             </a:ln>
             <a:extLst>
               <a:ext uri="{91240B29-F687-4f45-9708-019B960494DF}">
-                <a14:hiddenLine xmlns:a14="http://schemas.microsoft.com/office/drawing/2010/main" xmlns="" w="9525">
+                <a14:hiddenLine xmlns="" xmlns:a14="http://schemas.microsoft.com/office/drawing/2010/main" w="9525">
                   <a:solidFill>
                     <a:srgbClr val="000000"/>
                   </a:solidFill>
@@ -3014,7 +3021,7 @@
             </a:ln>
             <a:extLst>
               <a:ext uri="{91240B29-F687-4f45-9708-019B960494DF}">
-                <a14:hiddenLine xmlns:a14="http://schemas.microsoft.com/office/drawing/2010/main" xmlns="" w="9525">
+                <a14:hiddenLine xmlns="" xmlns:a14="http://schemas.microsoft.com/office/drawing/2010/main" w="9525">
                   <a:solidFill>
                     <a:srgbClr val="000000"/>
                   </a:solidFill>
@@ -3076,7 +3083,7 @@
             </a:ln>
             <a:extLst>
               <a:ext uri="{91240B29-F687-4f45-9708-019B960494DF}">
-                <a14:hiddenLine xmlns:a14="http://schemas.microsoft.com/office/drawing/2010/main" xmlns="" w="9525">
+                <a14:hiddenLine xmlns="" xmlns:a14="http://schemas.microsoft.com/office/drawing/2010/main" w="9525">
                   <a:solidFill>
                     <a:srgbClr val="000000"/>
                   </a:solidFill>
@@ -3166,7 +3173,7 @@
             </a:ln>
             <a:extLst>
               <a:ext uri="{91240B29-F687-4f45-9708-019B960494DF}">
-                <a14:hiddenLine xmlns:a14="http://schemas.microsoft.com/office/drawing/2010/main" xmlns="" w="9525">
+                <a14:hiddenLine xmlns="" xmlns:a14="http://schemas.microsoft.com/office/drawing/2010/main" w="9525">
                   <a:solidFill>
                     <a:srgbClr val="000000"/>
                   </a:solidFill>
@@ -3200,7 +3207,7 @@
             </a:ln>
             <a:extLst>
               <a:ext uri="{91240B29-F687-4f45-9708-019B960494DF}">
-                <a14:hiddenLine xmlns:a14="http://schemas.microsoft.com/office/drawing/2010/main" xmlns="" w="9525">
+                <a14:hiddenLine xmlns="" xmlns:a14="http://schemas.microsoft.com/office/drawing/2010/main" w="9525">
                   <a:solidFill>
                     <a:srgbClr val="000000"/>
                   </a:solidFill>
@@ -3265,7 +3272,7 @@
             </a:ln>
             <a:extLst>
               <a:ext uri="{91240B29-F687-4f45-9708-019B960494DF}">
-                <a14:hiddenLine xmlns:a14="http://schemas.microsoft.com/office/drawing/2010/main" xmlns="" w="9525">
+                <a14:hiddenLine xmlns="" xmlns:a14="http://schemas.microsoft.com/office/drawing/2010/main" w="9525">
                   <a:solidFill>
                     <a:srgbClr val="000000"/>
                   </a:solidFill>
@@ -3355,7 +3362,7 @@
             </a:ln>
             <a:extLst>
               <a:ext uri="{91240B29-F687-4f45-9708-019B960494DF}">
-                <a14:hiddenLine xmlns:a14="http://schemas.microsoft.com/office/drawing/2010/main" xmlns="" w="9525">
+                <a14:hiddenLine xmlns="" xmlns:a14="http://schemas.microsoft.com/office/drawing/2010/main" w="9525">
                   <a:solidFill>
                     <a:srgbClr val="000000"/>
                   </a:solidFill>
@@ -3417,7 +3424,7 @@
             </a:ln>
             <a:extLst>
               <a:ext uri="{91240B29-F687-4f45-9708-019B960494DF}">
-                <a14:hiddenLine xmlns:a14="http://schemas.microsoft.com/office/drawing/2010/main" xmlns="" w="9525">
+                <a14:hiddenLine xmlns="" xmlns:a14="http://schemas.microsoft.com/office/drawing/2010/main" w="9525">
                   <a:solidFill>
                     <a:srgbClr val="000000"/>
                   </a:solidFill>
@@ -3507,7 +3514,7 @@
             </a:ln>
             <a:extLst>
               <a:ext uri="{91240B29-F687-4f45-9708-019B960494DF}">
-                <a14:hiddenLine xmlns:a14="http://schemas.microsoft.com/office/drawing/2010/main" xmlns="" w="9525">
+                <a14:hiddenLine xmlns="" xmlns:a14="http://schemas.microsoft.com/office/drawing/2010/main" w="9525">
                   <a:solidFill>
                     <a:srgbClr val="000000"/>
                   </a:solidFill>
@@ -3597,7 +3604,7 @@
             </a:ln>
             <a:extLst>
               <a:ext uri="{91240B29-F687-4f45-9708-019B960494DF}">
-                <a14:hiddenLine xmlns:a14="http://schemas.microsoft.com/office/drawing/2010/main" xmlns="" w="9525">
+                <a14:hiddenLine xmlns="" xmlns:a14="http://schemas.microsoft.com/office/drawing/2010/main" w="9525">
                   <a:solidFill>
                     <a:srgbClr val="000000"/>
                   </a:solidFill>
@@ -3662,7 +3669,7 @@
             </a:ln>
             <a:extLst>
               <a:ext uri="{91240B29-F687-4f45-9708-019B960494DF}">
-                <a14:hiddenLine xmlns:a14="http://schemas.microsoft.com/office/drawing/2010/main" xmlns="" w="9525">
+                <a14:hiddenLine xmlns="" xmlns:a14="http://schemas.microsoft.com/office/drawing/2010/main" w="9525">
                   <a:solidFill>
                     <a:srgbClr val="000000"/>
                   </a:solidFill>
@@ -3724,7 +3731,7 @@
             </a:ln>
             <a:extLst>
               <a:ext uri="{91240B29-F687-4f45-9708-019B960494DF}">
-                <a14:hiddenLine xmlns:a14="http://schemas.microsoft.com/office/drawing/2010/main" xmlns="" w="9525">
+                <a14:hiddenLine xmlns="" xmlns:a14="http://schemas.microsoft.com/office/drawing/2010/main" w="9525">
                   <a:solidFill>
                     <a:srgbClr val="000000"/>
                   </a:solidFill>
@@ -3814,7 +3821,7 @@
             </a:ln>
             <a:extLst>
               <a:ext uri="{91240B29-F687-4f45-9708-019B960494DF}">
-                <a14:hiddenLine xmlns:a14="http://schemas.microsoft.com/office/drawing/2010/main" xmlns="" w="9525">
+                <a14:hiddenLine xmlns="" xmlns:a14="http://schemas.microsoft.com/office/drawing/2010/main" w="9525">
                   <a:solidFill>
                     <a:srgbClr val="000000"/>
                   </a:solidFill>
@@ -3904,7 +3911,7 @@
             </a:ln>
             <a:extLst>
               <a:ext uri="{91240B29-F687-4f45-9708-019B960494DF}">
-                <a14:hiddenLine xmlns:a14="http://schemas.microsoft.com/office/drawing/2010/main" xmlns="" w="9525">
+                <a14:hiddenLine xmlns="" xmlns:a14="http://schemas.microsoft.com/office/drawing/2010/main" w="9525">
                   <a:solidFill>
                     <a:srgbClr val="000000"/>
                   </a:solidFill>
@@ -3966,7 +3973,7 @@
             </a:ln>
             <a:extLst>
               <a:ext uri="{91240B29-F687-4f45-9708-019B960494DF}">
-                <a14:hiddenLine xmlns:a14="http://schemas.microsoft.com/office/drawing/2010/main" xmlns="" w="9525">
+                <a14:hiddenLine xmlns="" xmlns:a14="http://schemas.microsoft.com/office/drawing/2010/main" w="9525">
                   <a:solidFill>
                     <a:srgbClr val="000000"/>
                   </a:solidFill>
@@ -4086,7 +4093,7 @@
             </a:ln>
             <a:extLst>
               <a:ext uri="{91240B29-F687-4f45-9708-019B960494DF}">
-                <a14:hiddenLine xmlns:a14="http://schemas.microsoft.com/office/drawing/2010/main" xmlns="" w="9525">
+                <a14:hiddenLine xmlns="" xmlns:a14="http://schemas.microsoft.com/office/drawing/2010/main" w="9525">
                   <a:solidFill>
                     <a:srgbClr val="000000"/>
                   </a:solidFill>
@@ -4154,7 +4161,7 @@
             </a:ln>
             <a:extLst>
               <a:ext uri="{91240B29-F687-4f45-9708-019B960494DF}">
-                <a14:hiddenLine xmlns:a14="http://schemas.microsoft.com/office/drawing/2010/main" xmlns="" w="9525">
+                <a14:hiddenLine xmlns="" xmlns:a14="http://schemas.microsoft.com/office/drawing/2010/main" w="9525">
                   <a:solidFill>
                     <a:srgbClr val="000000"/>
                   </a:solidFill>
@@ -4244,7 +4251,7 @@
             </a:ln>
             <a:extLst>
               <a:ext uri="{91240B29-F687-4f45-9708-019B960494DF}">
-                <a14:hiddenLine xmlns:a14="http://schemas.microsoft.com/office/drawing/2010/main" xmlns="" w="9525">
+                <a14:hiddenLine xmlns="" xmlns:a14="http://schemas.microsoft.com/office/drawing/2010/main" w="9525">
                   <a:solidFill>
                     <a:srgbClr val="000000"/>
                   </a:solidFill>
@@ -4384,7 +4391,7 @@
           <a:p>
             <a:fld id="{69EEBA8F-642E-4A5E-AE0A-87163BDC325D}" type="datetimeFigureOut">
               <a:rPr lang="fr-FR" smtClean="0"/>
-              <a:t>15/05/2024</a:t>
+              <a:t>16/05/2024</a:t>
             </a:fld>
             <a:endParaRPr lang="fr-FR"/>
           </a:p>
@@ -4651,7 +4658,7 @@
           <a:p>
             <a:fld id="{69EEBA8F-642E-4A5E-AE0A-87163BDC325D}" type="datetimeFigureOut">
               <a:rPr lang="fr-FR" smtClean="0"/>
-              <a:t>15/05/2024</a:t>
+              <a:t>16/05/2024</a:t>
             </a:fld>
             <a:endParaRPr lang="fr-FR"/>
           </a:p>
@@ -4847,7 +4854,7 @@
           <a:p>
             <a:fld id="{69EEBA8F-642E-4A5E-AE0A-87163BDC325D}" type="datetimeFigureOut">
               <a:rPr lang="fr-FR" smtClean="0"/>
-              <a:t>15/05/2024</a:t>
+              <a:t>16/05/2024</a:t>
             </a:fld>
             <a:endParaRPr lang="fr-FR"/>
           </a:p>
@@ -5110,7 +5117,7 @@
           <a:p>
             <a:fld id="{69EEBA8F-642E-4A5E-AE0A-87163BDC325D}" type="datetimeFigureOut">
               <a:rPr lang="fr-FR" smtClean="0"/>
-              <a:t>15/05/2024</a:t>
+              <a:t>16/05/2024</a:t>
             </a:fld>
             <a:endParaRPr lang="fr-FR"/>
           </a:p>
@@ -5544,7 +5551,7 @@
           <a:p>
             <a:fld id="{69EEBA8F-642E-4A5E-AE0A-87163BDC325D}" type="datetimeFigureOut">
               <a:rPr lang="fr-FR" smtClean="0"/>
-              <a:t>15/05/2024</a:t>
+              <a:t>16/05/2024</a:t>
             </a:fld>
             <a:endParaRPr lang="fr-FR"/>
           </a:p>
@@ -6090,7 +6097,7 @@
           <a:p>
             <a:fld id="{69EEBA8F-642E-4A5E-AE0A-87163BDC325D}" type="datetimeFigureOut">
               <a:rPr lang="fr-FR" smtClean="0"/>
-              <a:t>15/05/2024</a:t>
+              <a:t>16/05/2024</a:t>
             </a:fld>
             <a:endParaRPr lang="fr-FR"/>
           </a:p>
@@ -6810,7 +6817,7 @@
           <a:p>
             <a:fld id="{69EEBA8F-642E-4A5E-AE0A-87163BDC325D}" type="datetimeFigureOut">
               <a:rPr lang="fr-FR" smtClean="0"/>
-              <a:t>15/05/2024</a:t>
+              <a:t>16/05/2024</a:t>
             </a:fld>
             <a:endParaRPr lang="fr-FR"/>
           </a:p>
@@ -6980,7 +6987,7 @@
           <a:p>
             <a:fld id="{69EEBA8F-642E-4A5E-AE0A-87163BDC325D}" type="datetimeFigureOut">
               <a:rPr lang="fr-FR" smtClean="0"/>
-              <a:t>15/05/2024</a:t>
+              <a:t>16/05/2024</a:t>
             </a:fld>
             <a:endParaRPr lang="fr-FR"/>
           </a:p>
@@ -7160,7 +7167,7 @@
           <a:p>
             <a:fld id="{69EEBA8F-642E-4A5E-AE0A-87163BDC325D}" type="datetimeFigureOut">
               <a:rPr lang="fr-FR" smtClean="0"/>
-              <a:t>15/05/2024</a:t>
+              <a:t>16/05/2024</a:t>
             </a:fld>
             <a:endParaRPr lang="fr-FR"/>
           </a:p>
@@ -7330,7 +7337,7 @@
           <a:p>
             <a:fld id="{69EEBA8F-642E-4A5E-AE0A-87163BDC325D}" type="datetimeFigureOut">
               <a:rPr lang="fr-FR" smtClean="0"/>
-              <a:t>15/05/2024</a:t>
+              <a:t>16/05/2024</a:t>
             </a:fld>
             <a:endParaRPr lang="fr-FR"/>
           </a:p>
@@ -7580,7 +7587,7 @@
           <a:p>
             <a:fld id="{69EEBA8F-642E-4A5E-AE0A-87163BDC325D}" type="datetimeFigureOut">
               <a:rPr lang="fr-FR" smtClean="0"/>
-              <a:t>15/05/2024</a:t>
+              <a:t>16/05/2024</a:t>
             </a:fld>
             <a:endParaRPr lang="fr-FR"/>
           </a:p>
@@ -7812,7 +7819,7 @@
           <a:p>
             <a:fld id="{69EEBA8F-642E-4A5E-AE0A-87163BDC325D}" type="datetimeFigureOut">
               <a:rPr lang="fr-FR" smtClean="0"/>
-              <a:t>15/05/2024</a:t>
+              <a:t>16/05/2024</a:t>
             </a:fld>
             <a:endParaRPr lang="fr-FR"/>
           </a:p>
@@ -8193,7 +8200,7 @@
           <a:p>
             <a:fld id="{69EEBA8F-642E-4A5E-AE0A-87163BDC325D}" type="datetimeFigureOut">
               <a:rPr lang="fr-FR" smtClean="0"/>
-              <a:t>15/05/2024</a:t>
+              <a:t>16/05/2024</a:t>
             </a:fld>
             <a:endParaRPr lang="fr-FR"/>
           </a:p>
@@ -8311,7 +8318,7 @@
           <a:p>
             <a:fld id="{69EEBA8F-642E-4A5E-AE0A-87163BDC325D}" type="datetimeFigureOut">
               <a:rPr lang="fr-FR" smtClean="0"/>
-              <a:t>15/05/2024</a:t>
+              <a:t>16/05/2024</a:t>
             </a:fld>
             <a:endParaRPr lang="fr-FR"/>
           </a:p>
@@ -8406,7 +8413,7 @@
           <a:p>
             <a:fld id="{69EEBA8F-642E-4A5E-AE0A-87163BDC325D}" type="datetimeFigureOut">
               <a:rPr lang="fr-FR" smtClean="0"/>
-              <a:t>15/05/2024</a:t>
+              <a:t>16/05/2024</a:t>
             </a:fld>
             <a:endParaRPr lang="fr-FR"/>
           </a:p>
@@ -8655,7 +8662,7 @@
           <a:p>
             <a:fld id="{69EEBA8F-642E-4A5E-AE0A-87163BDC325D}" type="datetimeFigureOut">
               <a:rPr lang="fr-FR" smtClean="0"/>
-              <a:t>15/05/2024</a:t>
+              <a:t>16/05/2024</a:t>
             </a:fld>
             <a:endParaRPr lang="fr-FR"/>
           </a:p>
@@ -8935,7 +8942,7 @@
           <a:p>
             <a:fld id="{69EEBA8F-642E-4A5E-AE0A-87163BDC325D}" type="datetimeFigureOut">
               <a:rPr lang="fr-FR" smtClean="0"/>
-              <a:t>15/05/2024</a:t>
+              <a:t>16/05/2024</a:t>
             </a:fld>
             <a:endParaRPr lang="fr-FR"/>
           </a:p>
@@ -9051,7 +9058,7 @@
           <a:noFill/>
           <a:extLst>
             <a:ext uri="{909E8E84-426E-40dd-AFC4-6F175D3DCCD1}">
-              <a14:hiddenFill xmlns:a14="http://schemas.microsoft.com/office/drawing/2010/main" xmlns="">
+              <a14:hiddenFill xmlns="" xmlns:a14="http://schemas.microsoft.com/office/drawing/2010/main">
                 <a:solidFill>
                   <a:srgbClr val="FFFFFF"/>
                 </a:solidFill>
@@ -9125,7 +9132,7 @@
               </a:ln>
               <a:extLst>
                 <a:ext uri="{91240B29-F687-4f45-9708-019B960494DF}">
-                  <a14:hiddenLine xmlns:a14="http://schemas.microsoft.com/office/drawing/2010/main" xmlns="" w="9525">
+                  <a14:hiddenLine xmlns="" xmlns:a14="http://schemas.microsoft.com/office/drawing/2010/main" w="9525">
                     <a:solidFill>
                       <a:srgbClr val="000000"/>
                     </a:solidFill>
@@ -9215,7 +9222,7 @@
               </a:ln>
               <a:extLst>
                 <a:ext uri="{91240B29-F687-4f45-9708-019B960494DF}">
-                  <a14:hiddenLine xmlns:a14="http://schemas.microsoft.com/office/drawing/2010/main" xmlns="" w="9525">
+                  <a14:hiddenLine xmlns="" xmlns:a14="http://schemas.microsoft.com/office/drawing/2010/main" w="9525">
                     <a:solidFill>
                       <a:srgbClr val="000000"/>
                     </a:solidFill>
@@ -9305,7 +9312,7 @@
               </a:ln>
               <a:extLst>
                 <a:ext uri="{91240B29-F687-4f45-9708-019B960494DF}">
-                  <a14:hiddenLine xmlns:a14="http://schemas.microsoft.com/office/drawing/2010/main" xmlns="" w="9525">
+                  <a14:hiddenLine xmlns="" xmlns:a14="http://schemas.microsoft.com/office/drawing/2010/main" w="9525">
                     <a:solidFill>
                       <a:srgbClr val="000000"/>
                     </a:solidFill>
@@ -9367,7 +9374,7 @@
               </a:ln>
               <a:extLst>
                 <a:ext uri="{91240B29-F687-4f45-9708-019B960494DF}">
-                  <a14:hiddenLine xmlns:a14="http://schemas.microsoft.com/office/drawing/2010/main" xmlns="" w="9525">
+                  <a14:hiddenLine xmlns="" xmlns:a14="http://schemas.microsoft.com/office/drawing/2010/main" w="9525">
                     <a:solidFill>
                       <a:srgbClr val="000000"/>
                     </a:solidFill>
@@ -9457,7 +9464,7 @@
               </a:ln>
               <a:extLst>
                 <a:ext uri="{91240B29-F687-4f45-9708-019B960494DF}">
-                  <a14:hiddenLine xmlns:a14="http://schemas.microsoft.com/office/drawing/2010/main" xmlns="" w="9525">
+                  <a14:hiddenLine xmlns="" xmlns:a14="http://schemas.microsoft.com/office/drawing/2010/main" w="9525">
                     <a:solidFill>
                       <a:srgbClr val="000000"/>
                     </a:solidFill>
@@ -9519,7 +9526,7 @@
               </a:ln>
               <a:extLst>
                 <a:ext uri="{91240B29-F687-4f45-9708-019B960494DF}">
-                  <a14:hiddenLine xmlns:a14="http://schemas.microsoft.com/office/drawing/2010/main" xmlns="" w="9525">
+                  <a14:hiddenLine xmlns="" xmlns:a14="http://schemas.microsoft.com/office/drawing/2010/main" w="9525">
                     <a:solidFill>
                       <a:srgbClr val="000000"/>
                     </a:solidFill>
@@ -9581,7 +9588,7 @@
               </a:ln>
               <a:extLst>
                 <a:ext uri="{91240B29-F687-4f45-9708-019B960494DF}">
-                  <a14:hiddenLine xmlns:a14="http://schemas.microsoft.com/office/drawing/2010/main" xmlns="" w="9525">
+                  <a14:hiddenLine xmlns="" xmlns:a14="http://schemas.microsoft.com/office/drawing/2010/main" w="9525">
                     <a:solidFill>
                       <a:srgbClr val="000000"/>
                     </a:solidFill>
@@ -9671,7 +9678,7 @@
               </a:ln>
               <a:extLst>
                 <a:ext uri="{91240B29-F687-4f45-9708-019B960494DF}">
-                  <a14:hiddenLine xmlns:a14="http://schemas.microsoft.com/office/drawing/2010/main" xmlns="" w="9525">
+                  <a14:hiddenLine xmlns="" xmlns:a14="http://schemas.microsoft.com/office/drawing/2010/main" w="9525">
                     <a:solidFill>
                       <a:srgbClr val="000000"/>
                     </a:solidFill>
@@ -9761,7 +9768,7 @@
               </a:ln>
               <a:extLst>
                 <a:ext uri="{91240B29-F687-4f45-9708-019B960494DF}">
-                  <a14:hiddenLine xmlns:a14="http://schemas.microsoft.com/office/drawing/2010/main" xmlns="" w="9525">
+                  <a14:hiddenLine xmlns="" xmlns:a14="http://schemas.microsoft.com/office/drawing/2010/main" w="9525">
                     <a:solidFill>
                       <a:srgbClr val="000000"/>
                     </a:solidFill>
@@ -9823,7 +9830,7 @@
               </a:ln>
               <a:extLst>
                 <a:ext uri="{91240B29-F687-4f45-9708-019B960494DF}">
-                  <a14:hiddenLine xmlns:a14="http://schemas.microsoft.com/office/drawing/2010/main" xmlns="" w="9525">
+                  <a14:hiddenLine xmlns="" xmlns:a14="http://schemas.microsoft.com/office/drawing/2010/main" w="9525">
                     <a:solidFill>
                       <a:srgbClr val="000000"/>
                     </a:solidFill>
@@ -9933,7 +9940,7 @@
               </a:ln>
               <a:extLst>
                 <a:ext uri="{91240B29-F687-4f45-9708-019B960494DF}">
-                  <a14:hiddenLine xmlns:a14="http://schemas.microsoft.com/office/drawing/2010/main" xmlns="" w="9525">
+                  <a14:hiddenLine xmlns="" xmlns:a14="http://schemas.microsoft.com/office/drawing/2010/main" w="9525">
                     <a:solidFill>
                       <a:srgbClr val="000000"/>
                     </a:solidFill>
@@ -10017,7 +10024,7 @@
               </a:ln>
               <a:extLst>
                 <a:ext uri="{91240B29-F687-4f45-9708-019B960494DF}">
-                  <a14:hiddenLine xmlns:a14="http://schemas.microsoft.com/office/drawing/2010/main" xmlns="" w="9525">
+                  <a14:hiddenLine xmlns="" xmlns:a14="http://schemas.microsoft.com/office/drawing/2010/main" w="9525">
                     <a:solidFill>
                       <a:srgbClr val="000000"/>
                     </a:solidFill>
@@ -10079,7 +10086,7 @@
               </a:ln>
               <a:extLst>
                 <a:ext uri="{91240B29-F687-4f45-9708-019B960494DF}">
-                  <a14:hiddenLine xmlns:a14="http://schemas.microsoft.com/office/drawing/2010/main" xmlns="" w="9525">
+                  <a14:hiddenLine xmlns="" xmlns:a14="http://schemas.microsoft.com/office/drawing/2010/main" w="9525">
                     <a:solidFill>
                       <a:srgbClr val="000000"/>
                     </a:solidFill>
@@ -10141,7 +10148,7 @@
               </a:ln>
               <a:extLst>
                 <a:ext uri="{91240B29-F687-4f45-9708-019B960494DF}">
-                  <a14:hiddenLine xmlns:a14="http://schemas.microsoft.com/office/drawing/2010/main" xmlns="" w="9525">
+                  <a14:hiddenLine xmlns="" xmlns:a14="http://schemas.microsoft.com/office/drawing/2010/main" w="9525">
                     <a:solidFill>
                       <a:srgbClr val="000000"/>
                     </a:solidFill>
@@ -10231,7 +10238,7 @@
               </a:ln>
               <a:extLst>
                 <a:ext uri="{91240B29-F687-4f45-9708-019B960494DF}">
-                  <a14:hiddenLine xmlns:a14="http://schemas.microsoft.com/office/drawing/2010/main" xmlns="" w="9525">
+                  <a14:hiddenLine xmlns="" xmlns:a14="http://schemas.microsoft.com/office/drawing/2010/main" w="9525">
                     <a:solidFill>
                       <a:srgbClr val="000000"/>
                     </a:solidFill>
@@ -10265,7 +10272,7 @@
               </a:ln>
               <a:extLst>
                 <a:ext uri="{91240B29-F687-4f45-9708-019B960494DF}">
-                  <a14:hiddenLine xmlns:a14="http://schemas.microsoft.com/office/drawing/2010/main" xmlns="" w="9525">
+                  <a14:hiddenLine xmlns="" xmlns:a14="http://schemas.microsoft.com/office/drawing/2010/main" w="9525">
                     <a:solidFill>
                       <a:srgbClr val="000000"/>
                     </a:solidFill>
@@ -10330,7 +10337,7 @@
               </a:ln>
               <a:extLst>
                 <a:ext uri="{91240B29-F687-4f45-9708-019B960494DF}">
-                  <a14:hiddenLine xmlns:a14="http://schemas.microsoft.com/office/drawing/2010/main" xmlns="" w="9525">
+                  <a14:hiddenLine xmlns="" xmlns:a14="http://schemas.microsoft.com/office/drawing/2010/main" w="9525">
                     <a:solidFill>
                       <a:srgbClr val="000000"/>
                     </a:solidFill>
@@ -10420,7 +10427,7 @@
               </a:ln>
               <a:extLst>
                 <a:ext uri="{91240B29-F687-4f45-9708-019B960494DF}">
-                  <a14:hiddenLine xmlns:a14="http://schemas.microsoft.com/office/drawing/2010/main" xmlns="" w="9525">
+                  <a14:hiddenLine xmlns="" xmlns:a14="http://schemas.microsoft.com/office/drawing/2010/main" w="9525">
                     <a:solidFill>
                       <a:srgbClr val="000000"/>
                     </a:solidFill>
@@ -10482,7 +10489,7 @@
               </a:ln>
               <a:extLst>
                 <a:ext uri="{91240B29-F687-4f45-9708-019B960494DF}">
-                  <a14:hiddenLine xmlns:a14="http://schemas.microsoft.com/office/drawing/2010/main" xmlns="" w="9525">
+                  <a14:hiddenLine xmlns="" xmlns:a14="http://schemas.microsoft.com/office/drawing/2010/main" w="9525">
                     <a:solidFill>
                       <a:srgbClr val="000000"/>
                     </a:solidFill>
@@ -10572,7 +10579,7 @@
               </a:ln>
               <a:extLst>
                 <a:ext uri="{91240B29-F687-4f45-9708-019B960494DF}">
-                  <a14:hiddenLine xmlns:a14="http://schemas.microsoft.com/office/drawing/2010/main" xmlns="" w="9525">
+                  <a14:hiddenLine xmlns="" xmlns:a14="http://schemas.microsoft.com/office/drawing/2010/main" w="9525">
                     <a:solidFill>
                       <a:srgbClr val="000000"/>
                     </a:solidFill>
@@ -10637,7 +10644,7 @@
               </a:ln>
               <a:extLst>
                 <a:ext uri="{91240B29-F687-4f45-9708-019B960494DF}">
-                  <a14:hiddenLine xmlns:a14="http://schemas.microsoft.com/office/drawing/2010/main" xmlns="" w="9525">
+                  <a14:hiddenLine xmlns="" xmlns:a14="http://schemas.microsoft.com/office/drawing/2010/main" w="9525">
                     <a:solidFill>
                       <a:srgbClr val="000000"/>
                     </a:solidFill>
@@ -10699,7 +10706,7 @@
               </a:ln>
               <a:extLst>
                 <a:ext uri="{91240B29-F687-4f45-9708-019B960494DF}">
-                  <a14:hiddenLine xmlns:a14="http://schemas.microsoft.com/office/drawing/2010/main" xmlns="" w="9525">
+                  <a14:hiddenLine xmlns="" xmlns:a14="http://schemas.microsoft.com/office/drawing/2010/main" w="9525">
                     <a:solidFill>
                       <a:srgbClr val="000000"/>
                     </a:solidFill>
@@ -10789,7 +10796,7 @@
               </a:ln>
               <a:extLst>
                 <a:ext uri="{91240B29-F687-4f45-9708-019B960494DF}">
-                  <a14:hiddenLine xmlns:a14="http://schemas.microsoft.com/office/drawing/2010/main" xmlns="" w="9525">
+                  <a14:hiddenLine xmlns="" xmlns:a14="http://schemas.microsoft.com/office/drawing/2010/main" w="9525">
                     <a:solidFill>
                       <a:srgbClr val="000000"/>
                     </a:solidFill>
@@ -10879,7 +10886,7 @@
               </a:ln>
               <a:extLst>
                 <a:ext uri="{91240B29-F687-4f45-9708-019B960494DF}">
-                  <a14:hiddenLine xmlns:a14="http://schemas.microsoft.com/office/drawing/2010/main" xmlns="" w="9525">
+                  <a14:hiddenLine xmlns="" xmlns:a14="http://schemas.microsoft.com/office/drawing/2010/main" w="9525">
                     <a:solidFill>
                       <a:srgbClr val="000000"/>
                     </a:solidFill>
@@ -10944,7 +10951,7 @@
               </a:ln>
               <a:extLst>
                 <a:ext uri="{91240B29-F687-4f45-9708-019B960494DF}">
-                  <a14:hiddenLine xmlns:a14="http://schemas.microsoft.com/office/drawing/2010/main" xmlns="" w="9525">
+                  <a14:hiddenLine xmlns="" xmlns:a14="http://schemas.microsoft.com/office/drawing/2010/main" w="9525">
                     <a:solidFill>
                       <a:srgbClr val="000000"/>
                     </a:solidFill>
@@ -11064,7 +11071,7 @@
               </a:ln>
               <a:extLst>
                 <a:ext uri="{91240B29-F687-4f45-9708-019B960494DF}">
-                  <a14:hiddenLine xmlns:a14="http://schemas.microsoft.com/office/drawing/2010/main" xmlns="" w="9525">
+                  <a14:hiddenLine xmlns="" xmlns:a14="http://schemas.microsoft.com/office/drawing/2010/main" w="9525">
                     <a:solidFill>
                       <a:srgbClr val="000000"/>
                     </a:solidFill>
@@ -11162,7 +11169,7 @@
               </a:ln>
               <a:extLst>
                 <a:ext uri="{91240B29-F687-4f45-9708-019B960494DF}">
-                  <a14:hiddenLine xmlns:a14="http://schemas.microsoft.com/office/drawing/2010/main" xmlns="" w="9525">
+                  <a14:hiddenLine xmlns="" xmlns:a14="http://schemas.microsoft.com/office/drawing/2010/main" w="9525">
                     <a:solidFill>
                       <a:srgbClr val="000000"/>
                     </a:solidFill>
@@ -11277,7 +11284,7 @@
               </a:ln>
               <a:extLst>
                 <a:ext uri="{91240B29-F687-4f45-9708-019B960494DF}">
-                  <a14:hiddenLine xmlns:a14="http://schemas.microsoft.com/office/drawing/2010/main" xmlns="" w="9525">
+                  <a14:hiddenLine xmlns="" xmlns:a14="http://schemas.microsoft.com/office/drawing/2010/main" w="9525">
                     <a:solidFill>
                       <a:srgbClr val="000000"/>
                     </a:solidFill>
@@ -11367,7 +11374,7 @@
               </a:ln>
               <a:extLst>
                 <a:ext uri="{91240B29-F687-4f45-9708-019B960494DF}">
-                  <a14:hiddenLine xmlns:a14="http://schemas.microsoft.com/office/drawing/2010/main" xmlns="" w="9525">
+                  <a14:hiddenLine xmlns="" xmlns:a14="http://schemas.microsoft.com/office/drawing/2010/main" w="9525">
                     <a:solidFill>
                       <a:srgbClr val="000000"/>
                     </a:solidFill>
@@ -11432,7 +11439,7 @@
               </a:ln>
               <a:extLst>
                 <a:ext uri="{91240B29-F687-4f45-9708-019B960494DF}">
-                  <a14:hiddenLine xmlns:a14="http://schemas.microsoft.com/office/drawing/2010/main" xmlns="" w="9525">
+                  <a14:hiddenLine xmlns="" xmlns:a14="http://schemas.microsoft.com/office/drawing/2010/main" w="9525">
                     <a:solidFill>
                       <a:srgbClr val="000000"/>
                     </a:solidFill>
@@ -11522,7 +11529,7 @@
               </a:ln>
               <a:extLst>
                 <a:ext uri="{91240B29-F687-4f45-9708-019B960494DF}">
-                  <a14:hiddenLine xmlns:a14="http://schemas.microsoft.com/office/drawing/2010/main" xmlns="" w="9525">
+                  <a14:hiddenLine xmlns="" xmlns:a14="http://schemas.microsoft.com/office/drawing/2010/main" w="9525">
                     <a:solidFill>
                       <a:srgbClr val="000000"/>
                     </a:solidFill>
@@ -11590,7 +11597,7 @@
               </a:ln>
               <a:extLst>
                 <a:ext uri="{91240B29-F687-4f45-9708-019B960494DF}">
-                  <a14:hiddenLine xmlns:a14="http://schemas.microsoft.com/office/drawing/2010/main" xmlns="" w="9525">
+                  <a14:hiddenLine xmlns="" xmlns:a14="http://schemas.microsoft.com/office/drawing/2010/main" w="9525">
                     <a:solidFill>
                       <a:srgbClr val="000000"/>
                     </a:solidFill>
@@ -11680,7 +11687,7 @@
               </a:ln>
               <a:extLst>
                 <a:ext uri="{91240B29-F687-4f45-9708-019B960494DF}">
-                  <a14:hiddenLine xmlns:a14="http://schemas.microsoft.com/office/drawing/2010/main" xmlns="" w="9525">
+                  <a14:hiddenLine xmlns="" xmlns:a14="http://schemas.microsoft.com/office/drawing/2010/main" w="9525">
                     <a:solidFill>
                       <a:srgbClr val="000000"/>
                     </a:solidFill>
@@ -11748,7 +11755,7 @@
               </a:ln>
               <a:extLst>
                 <a:ext uri="{91240B29-F687-4f45-9708-019B960494DF}">
-                  <a14:hiddenLine xmlns:a14="http://schemas.microsoft.com/office/drawing/2010/main" xmlns="" w="9525">
+                  <a14:hiddenLine xmlns="" xmlns:a14="http://schemas.microsoft.com/office/drawing/2010/main" w="9525">
                     <a:solidFill>
                       <a:srgbClr val="000000"/>
                     </a:solidFill>
@@ -11838,7 +11845,7 @@
               </a:ln>
               <a:extLst>
                 <a:ext uri="{91240B29-F687-4f45-9708-019B960494DF}">
-                  <a14:hiddenLine xmlns:a14="http://schemas.microsoft.com/office/drawing/2010/main" xmlns="" w="9525">
+                  <a14:hiddenLine xmlns="" xmlns:a14="http://schemas.microsoft.com/office/drawing/2010/main" w="9525">
                     <a:solidFill>
                       <a:srgbClr val="000000"/>
                     </a:solidFill>
@@ -11872,7 +11879,7 @@
               </a:ln>
               <a:extLst>
                 <a:ext uri="{91240B29-F687-4f45-9708-019B960494DF}">
-                  <a14:hiddenLine xmlns:a14="http://schemas.microsoft.com/office/drawing/2010/main" xmlns="" w="9525">
+                  <a14:hiddenLine xmlns="" xmlns:a14="http://schemas.microsoft.com/office/drawing/2010/main" w="9525">
                     <a:solidFill>
                       <a:srgbClr val="000000"/>
                     </a:solidFill>
@@ -12012,7 +12019,7 @@
           <a:p>
             <a:fld id="{69EEBA8F-642E-4A5E-AE0A-87163BDC325D}" type="datetimeFigureOut">
               <a:rPr lang="fr-FR" smtClean="0"/>
-              <a:t>15/05/2024</a:t>
+              <a:t>16/05/2024</a:t>
             </a:fld>
             <a:endParaRPr lang="fr-FR"/>
           </a:p>
@@ -12442,7 +12449,12 @@
             <p:ph type="ctrTitle"/>
           </p:nvPr>
         </p:nvSpPr>
-        <p:spPr/>
+        <p:spPr>
+          <a:xfrm>
+            <a:off x="1798045" y="263479"/>
+            <a:ext cx="8791575" cy="2387600"/>
+          </a:xfrm>
+        </p:spPr>
         <p:txBody>
           <a:bodyPr>
             <a:normAutofit/>
@@ -12452,7 +12464,15 @@
             <a:pPr algn="ctr"/>
             <a:r>
               <a:rPr lang="fr-FR" dirty="0" smtClean="0"/>
-              <a:t>Projet de NSI :</a:t>
+              <a:t>Notre Projet </a:t>
+            </a:r>
+            <a:r>
+              <a:rPr lang="fr-FR" dirty="0" smtClean="0"/>
+              <a:t>de </a:t>
+            </a:r>
+            <a:r>
+              <a:rPr lang="fr-FR" dirty="0" smtClean="0"/>
+              <a:t>NSI</a:t>
             </a:r>
             <a:br>
               <a:rPr lang="fr-FR" dirty="0" smtClean="0"/>
@@ -12460,19 +12480,31 @@
             <a:r>
               <a:rPr lang="fr-FR" dirty="0" err="1" smtClean="0">
                 <a:solidFill>
-                  <a:srgbClr val="FFC000"/>
+                  <a:srgbClr val="FF0000"/>
                 </a:solidFill>
               </a:rPr>
-              <a:t>Biblioword</a:t>
+              <a:t>BibliOworld</a:t>
             </a:r>
             <a:r>
-              <a:rPr lang="fr-FR" dirty="0"/>
+              <a:rPr lang="fr-FR" dirty="0">
+                <a:solidFill>
+                  <a:srgbClr val="FF0000"/>
+                </a:solidFill>
+              </a:rPr>
               <a:t/>
             </a:r>
             <a:br>
-              <a:rPr lang="fr-FR" dirty="0"/>
+              <a:rPr lang="fr-FR" dirty="0">
+                <a:solidFill>
+                  <a:srgbClr val="FF0000"/>
+                </a:solidFill>
+              </a:rPr>
             </a:br>
-            <a:endParaRPr lang="fr-FR" dirty="0"/>
+            <a:endParaRPr lang="fr-FR" dirty="0">
+              <a:solidFill>
+                <a:srgbClr val="FF0000"/>
+              </a:solidFill>
+            </a:endParaRPr>
           </a:p>
         </p:txBody>
       </p:sp>
@@ -12488,7 +12520,7 @@
         </p:nvSpPr>
         <p:spPr>
           <a:xfrm>
-            <a:off x="7524206" y="5499464"/>
+            <a:off x="7733212" y="5946776"/>
             <a:ext cx="3814355" cy="666204"/>
           </a:xfrm>
         </p:spPr>
@@ -12506,6 +12538,47 @@
           </a:p>
         </p:txBody>
       </p:sp>
+      <p:pic>
+        <p:nvPicPr>
+          <p:cNvPr id="1026" name="Picture 2" descr="Bibliothèque municipale en ligne - Ville de Soulac"/>
+          <p:cNvPicPr>
+            <a:picLocks noChangeAspect="1" noChangeArrowheads="1"/>
+          </p:cNvPicPr>
+          <p:nvPr/>
+        </p:nvPicPr>
+        <p:blipFill>
+          <a:blip r:embed="rId2">
+            <a:extLst>
+              <a:ext uri="{28A0092B-C50C-407E-A947-70E740481C1C}">
+                <a14:useLocalDpi xmlns:a14="http://schemas.microsoft.com/office/drawing/2010/main" val="0"/>
+              </a:ext>
+            </a:extLst>
+          </a:blip>
+          <a:srcRect/>
+          <a:stretch>
+            <a:fillRect/>
+          </a:stretch>
+        </p:blipFill>
+        <p:spPr bwMode="auto">
+          <a:xfrm rot="10800000" flipV="1">
+            <a:off x="3123473" y="2651080"/>
+            <a:ext cx="6140721" cy="3070361"/>
+          </a:xfrm>
+          <a:prstGeom prst="rect">
+            <a:avLst/>
+          </a:prstGeom>
+          <a:noFill/>
+          <a:extLst>
+            <a:ext uri="{909E8E84-426E-40DD-AFC4-6F175D3DCCD1}">
+              <a14:hiddenFill xmlns:a14="http://schemas.microsoft.com/office/drawing/2010/main">
+                <a:solidFill>
+                  <a:srgbClr val="FFFFFF"/>
+                </a:solidFill>
+              </a14:hiddenFill>
+            </a:ext>
+          </a:extLst>
+        </p:spPr>
+      </p:pic>
     </p:spTree>
     <p:extLst>
       <p:ext uri="{BB962C8B-B14F-4D97-AF65-F5344CB8AC3E}">
@@ -12545,6 +12618,114 @@
       </p:grpSpPr>
       <p:sp>
         <p:nvSpPr>
+          <p:cNvPr id="3" name="Espace réservé du contenu 2"/>
+          <p:cNvSpPr>
+            <a:spLocks noGrp="1"/>
+          </p:cNvSpPr>
+          <p:nvPr>
+            <p:ph idx="1"/>
+          </p:nvPr>
+        </p:nvSpPr>
+        <p:spPr/>
+        <p:txBody>
+          <a:bodyPr/>
+          <a:lstStyle/>
+          <a:p>
+            <a:pPr marL="457200" lvl="1" indent="0">
+              <a:buNone/>
+            </a:pPr>
+            <a:r>
+              <a:rPr lang="fr-FR" dirty="0" smtClean="0"/>
+              <a:t>-Gestion des erreurs dans la base de donnée </a:t>
+            </a:r>
+            <a:r>
+              <a:rPr lang="fr-FR" dirty="0" err="1" smtClean="0"/>
+              <a:t>Main_Data</a:t>
+            </a:r>
+            <a:endParaRPr lang="fr-FR" dirty="0" smtClean="0"/>
+          </a:p>
+          <a:p>
+            <a:pPr marL="457200" lvl="1" indent="0">
+              <a:buNone/>
+            </a:pPr>
+            <a:r>
+              <a:rPr lang="fr-FR" dirty="0" smtClean="0"/>
+              <a:t>-Création de résumé / description pour nos œuvres</a:t>
+            </a:r>
+          </a:p>
+          <a:p>
+            <a:pPr marL="457200" lvl="1" indent="0">
+              <a:buNone/>
+            </a:pPr>
+            <a:r>
+              <a:rPr lang="fr-FR" dirty="0" smtClean="0"/>
+              <a:t>-Résolution d’erreurs</a:t>
+            </a:r>
+          </a:p>
+        </p:txBody>
+      </p:sp>
+      <p:sp>
+        <p:nvSpPr>
+          <p:cNvPr id="4" name="Titre 3"/>
+          <p:cNvSpPr>
+            <a:spLocks noGrp="1"/>
+          </p:cNvSpPr>
+          <p:nvPr>
+            <p:ph type="title"/>
+          </p:nvPr>
+        </p:nvSpPr>
+        <p:spPr/>
+        <p:txBody>
+          <a:bodyPr/>
+          <a:lstStyle/>
+          <a:p>
+            <a:r>
+              <a:rPr lang="fr-FR" dirty="0" smtClean="0"/>
+              <a:t>Notre utilisation des IA génératives</a:t>
+            </a:r>
+            <a:endParaRPr lang="fr-FR" dirty="0"/>
+          </a:p>
+        </p:txBody>
+      </p:sp>
+    </p:spTree>
+    <p:extLst>
+      <p:ext uri="{BB962C8B-B14F-4D97-AF65-F5344CB8AC3E}">
+        <p14:creationId xmlns:p14="http://schemas.microsoft.com/office/powerpoint/2010/main" val="3540525932"/>
+      </p:ext>
+    </p:extLst>
+  </p:cSld>
+  <p:clrMapOvr>
+    <a:masterClrMapping/>
+  </p:clrMapOvr>
+  <p:timing>
+    <p:tnLst>
+      <p:par>
+        <p:cTn id="1" dur="indefinite" restart="never" nodeType="tmRoot"/>
+      </p:par>
+    </p:tnLst>
+  </p:timing>
+</p:sld>
+</file>
+
+<file path=ppt/slides/slide3.xml><?xml version="1.0" encoding="utf-8"?>
+<p:sld xmlns:a="http://schemas.openxmlformats.org/drawingml/2006/main" xmlns:r="http://schemas.openxmlformats.org/officeDocument/2006/relationships" xmlns:p="http://schemas.openxmlformats.org/presentationml/2006/main">
+  <p:cSld>
+    <p:spTree>
+      <p:nvGrpSpPr>
+        <p:cNvPr id="1" name=""/>
+        <p:cNvGrpSpPr/>
+        <p:nvPr/>
+      </p:nvGrpSpPr>
+      <p:grpSpPr>
+        <a:xfrm>
+          <a:off x="0" y="0"/>
+          <a:ext cx="0" cy="0"/>
+          <a:chOff x="0" y="0"/>
+          <a:chExt cx="0" cy="0"/>
+        </a:xfrm>
+      </p:grpSpPr>
+      <p:sp>
+        <p:nvSpPr>
           <p:cNvPr id="2" name="Titre 1"/>
           <p:cNvSpPr>
             <a:spLocks noGrp="1"/>
@@ -12560,7 +12741,7 @@
           <a:p>
             <a:r>
               <a:rPr lang="fr-FR" dirty="0" smtClean="0"/>
-              <a:t>L’ idée initiale:</a:t>
+              <a:t>L’architecture de notre Site web</a:t>
             </a:r>
             <a:endParaRPr lang="fr-FR" dirty="0"/>
           </a:p>
@@ -12581,9 +12762,10 @@
           <a:bodyPr/>
           <a:lstStyle/>
           <a:p>
-            <a:pPr marL="457200" lvl="1" indent="0">
-              <a:buNone/>
-            </a:pPr>
+            <a:r>
+              <a:rPr lang="fr-FR" dirty="0" smtClean="0"/>
+              <a:t>Nous avons choisis de</a:t>
+            </a:r>
             <a:endParaRPr lang="fr-FR" dirty="0"/>
           </a:p>
         </p:txBody>
@@ -12591,13 +12773,99 @@
     </p:spTree>
     <p:extLst>
       <p:ext uri="{BB962C8B-B14F-4D97-AF65-F5344CB8AC3E}">
-        <p14:creationId xmlns:p14="http://schemas.microsoft.com/office/powerpoint/2010/main" val="3540525932"/>
+        <p14:creationId xmlns:p14="http://schemas.microsoft.com/office/powerpoint/2010/main" val="3907402431"/>
       </p:ext>
     </p:extLst>
   </p:cSld>
   <p:clrMapOvr>
     <a:masterClrMapping/>
   </p:clrMapOvr>
+  <p:timing>
+    <p:tnLst>
+      <p:par>
+        <p:cTn id="1" dur="indefinite" restart="never" nodeType="tmRoot"/>
+      </p:par>
+    </p:tnLst>
+  </p:timing>
+</p:sld>
+</file>
+
+<file path=ppt/slides/slide4.xml><?xml version="1.0" encoding="utf-8"?>
+<p:sld xmlns:a="http://schemas.openxmlformats.org/drawingml/2006/main" xmlns:r="http://schemas.openxmlformats.org/officeDocument/2006/relationships" xmlns:p="http://schemas.openxmlformats.org/presentationml/2006/main">
+  <p:cSld>
+    <p:spTree>
+      <p:nvGrpSpPr>
+        <p:cNvPr id="1" name=""/>
+        <p:cNvGrpSpPr/>
+        <p:nvPr/>
+      </p:nvGrpSpPr>
+      <p:grpSpPr>
+        <a:xfrm>
+          <a:off x="0" y="0"/>
+          <a:ext cx="0" cy="0"/>
+          <a:chOff x="0" y="0"/>
+          <a:chExt cx="0" cy="0"/>
+        </a:xfrm>
+      </p:grpSpPr>
+      <p:sp>
+        <p:nvSpPr>
+          <p:cNvPr id="2" name="Titre 1"/>
+          <p:cNvSpPr>
+            <a:spLocks noGrp="1"/>
+          </p:cNvSpPr>
+          <p:nvPr>
+            <p:ph type="title"/>
+          </p:nvPr>
+        </p:nvSpPr>
+        <p:spPr/>
+        <p:txBody>
+          <a:bodyPr/>
+          <a:lstStyle/>
+          <a:p>
+            <a:r>
+              <a:rPr lang="fr-FR" dirty="0" smtClean="0"/>
+              <a:t>Merci de nous avoir écoutés !!!</a:t>
+            </a:r>
+            <a:endParaRPr lang="fr-FR" dirty="0"/>
+          </a:p>
+        </p:txBody>
+      </p:sp>
+      <p:sp>
+        <p:nvSpPr>
+          <p:cNvPr id="3" name="Espace réservé du contenu 2"/>
+          <p:cNvSpPr>
+            <a:spLocks noGrp="1"/>
+          </p:cNvSpPr>
+          <p:nvPr>
+            <p:ph idx="1"/>
+          </p:nvPr>
+        </p:nvSpPr>
+        <p:spPr/>
+        <p:txBody>
+          <a:bodyPr/>
+          <a:lstStyle/>
+          <a:p>
+            <a:endParaRPr lang="fr-FR"/>
+          </a:p>
+        </p:txBody>
+      </p:sp>
+    </p:spTree>
+    <p:extLst>
+      <p:ext uri="{BB962C8B-B14F-4D97-AF65-F5344CB8AC3E}">
+        <p14:creationId xmlns:p14="http://schemas.microsoft.com/office/powerpoint/2010/main" val="2173447504"/>
+      </p:ext>
+    </p:extLst>
+  </p:cSld>
+  <p:clrMapOvr>
+    <a:masterClrMapping/>
+  </p:clrMapOvr>
+  <p:timing>
+    <p:tnLst>
+      <p:par>
+        <p:cTn id="1" dur="indefinite" restart="never" nodeType="tmRoot"/>
+      </p:par>
+    </p:tnLst>
+  </p:timing>
 </p:sld>
 </file>
 

</xml_diff>